<commit_message>
Class sessions and calendar_reported
</commit_message>
<xml_diff>
--- a/Class_sessions/2020-09-29 PE view of how hot air rises/HW3_prep_PE_hotairrises.pptx
+++ b/Class_sessions/2020-09-29 PE view of how hot air rises/HW3_prep_PE_hotairrises.pptx
@@ -1,6 +1,6 @@
 
 <file path=ppt/presentation.xml><?xml version="1.0" encoding="utf-8"?>
-<p:presentation xmlns:a="http://schemas.openxmlformats.org/drawingml/2006/main" xmlns:r="http://schemas.openxmlformats.org/officeDocument/2006/relationships" xmlns:p="http://schemas.openxmlformats.org/presentationml/2006/main" compatMode="1" strictFirstAndLastChars="0" saveSubsetFonts="1" autoCompressPictures="0">
+<p:presentation xmlns:a="http://schemas.openxmlformats.org/drawingml/2006/main" xmlns:r="http://schemas.openxmlformats.org/officeDocument/2006/relationships" xmlns:p="http://schemas.openxmlformats.org/presentationml/2006/main" strictFirstAndLastChars="0" saveSubsetFonts="1" autoCompressPictures="0">
   <p:sldMasterIdLst>
     <p:sldMasterId id="2147483648" r:id="rId1"/>
   </p:sldMasterIdLst>
@@ -15590,7 +15590,7 @@
         <p:spPr bwMode="auto">
           <a:xfrm>
             <a:off x="0" y="30163"/>
-            <a:ext cx="9144000" cy="2062162"/>
+            <a:ext cx="9144000" cy="2246769"/>
           </a:xfrm>
           <a:prstGeom prst="rect">
             <a:avLst/>
@@ -15718,7 +15718,7 @@
           <a:p>
             <a:pPr algn="ctr"/>
             <a:r>
-              <a:rPr lang="en-US" altLang="en-US" sz="3200">
+              <a:rPr lang="en-US" altLang="en-US" sz="2800" dirty="0">
                 <a:solidFill>
                   <a:srgbClr val="0000FF"/>
                 </a:solidFill>
@@ -15735,7 +15735,7 @@
           <a:p>
             <a:pPr algn="ctr"/>
             <a:r>
-              <a:rPr lang="en-US" altLang="en-US" sz="3200">
+              <a:rPr lang="en-US" altLang="en-US" sz="2800" dirty="0">
                 <a:solidFill>
                   <a:srgbClr val="FF0000"/>
                 </a:solidFill>
@@ -15749,7 +15749,7 @@
               <a:t>If only we could clobber the “gradient of </a:t>
             </a:r>
             <a:r>
-              <a:rPr lang="en-US" altLang="en-US" sz="3200">
+              <a:rPr lang="en-US" altLang="en-US" sz="2800" dirty="0">
                 <a:solidFill>
                   <a:srgbClr val="FF0000"/>
                 </a:solidFill>
@@ -15763,7 +15763,7 @@
               <a:t>F</a:t>
             </a:r>
             <a:r>
-              <a:rPr lang="en-US" altLang="en-US" sz="3200">
+              <a:rPr lang="en-US" altLang="en-US" sz="2800" dirty="0">
                 <a:solidFill>
                   <a:srgbClr val="FF0000"/>
                 </a:solidFill>
@@ -15776,8 +15776,25 @@
               </a:rPr>
               <a:t>” term...</a:t>
             </a:r>
+          </a:p>
+          <a:p>
+            <a:pPr algn="ctr"/>
             <a:r>
-              <a:rPr lang="en-US" altLang="en-US" sz="3200">
+              <a:rPr lang="en-US" altLang="en-US" sz="2800" dirty="0">
+                <a:solidFill>
+                  <a:srgbClr val="FF0000"/>
+                </a:solidFill>
+                <a:effectLst>
+                  <a:outerShdw blurRad="38100" dist="38100" dir="2700000" algn="tl">
+                    <a:srgbClr val="C0C0C0"/>
+                  </a:outerShdw>
+                </a:effectLst>
+                <a:latin typeface="Times" pitchFamily="2" charset="0"/>
+              </a:rPr>
+              <a:t>that way lies vorticity as we have seen!</a:t>
+            </a:r>
+            <a:r>
+              <a:rPr lang="en-US" altLang="en-US" sz="2800" dirty="0">
                 <a:solidFill>
                   <a:srgbClr val="0000FF"/>
                 </a:solidFill>
@@ -15907,7 +15924,7 @@
               <a:defRPr/>
             </a:pPr>
             <a:r>
-              <a:rPr lang="en-US" sz="3200">
+              <a:rPr lang="en-US" sz="3200" dirty="0">
                 <a:effectLst>
                   <a:outerShdw blurRad="38100" dist="38100" dir="2700000" algn="tl">
                     <a:srgbClr val="DDDDDD"/>

</xml_diff>